<commit_message>
eklemeler yapılacak olan sunum
</commit_message>
<xml_diff>
--- a/WTWY Street Teams_2.pptx
+++ b/WTWY Street Teams_2.pptx
@@ -5,7 +5,7 @@
     <p:sldMasterId id="2147483811" r:id="rId1"/>
   </p:sldMasterIdLst>
   <p:notesMasterIdLst>
-    <p:notesMasterId r:id="rId12"/>
+    <p:notesMasterId r:id="rId13"/>
   </p:notesMasterIdLst>
   <p:sldIdLst>
     <p:sldId id="259" r:id="rId2"/>
@@ -18,6 +18,7 @@
     <p:sldId id="265" r:id="rId9"/>
     <p:sldId id="266" r:id="rId10"/>
     <p:sldId id="267" r:id="rId11"/>
+    <p:sldId id="268" r:id="rId12"/>
   </p:sldIdLst>
   <p:sldSz cx="12192000" cy="6858000"/>
   <p:notesSz cx="6858000" cy="9144000"/>
@@ -1053,6 +1054,90 @@
     <p:extLst>
       <p:ext uri="{BB962C8B-B14F-4D97-AF65-F5344CB8AC3E}">
         <p14:creationId xmlns:p14="http://schemas.microsoft.com/office/powerpoint/2010/main" val="1164815364"/>
+      </p:ext>
+    </p:extLst>
+  </p:cSld>
+  <p:clrMapOvr>
+    <a:masterClrMapping/>
+  </p:clrMapOvr>
+</p:notes>
+</file>
+
+<file path=ppt/notesSlides/notesSlide8.xml><?xml version="1.0" encoding="utf-8"?>
+<p:notes xmlns:a="http://schemas.openxmlformats.org/drawingml/2006/main" xmlns:r="http://schemas.openxmlformats.org/officeDocument/2006/relationships" xmlns:p="http://schemas.openxmlformats.org/presentationml/2006/main">
+  <p:cSld>
+    <p:spTree>
+      <p:nvGrpSpPr>
+        <p:cNvPr id="1" name=""/>
+        <p:cNvGrpSpPr/>
+        <p:nvPr/>
+      </p:nvGrpSpPr>
+      <p:grpSpPr>
+        <a:xfrm>
+          <a:off x="0" y="0"/>
+          <a:ext cx="0" cy="0"/>
+          <a:chOff x="0" y="0"/>
+          <a:chExt cx="0" cy="0"/>
+        </a:xfrm>
+      </p:grpSpPr>
+      <p:sp>
+        <p:nvSpPr>
+          <p:cNvPr id="2" name="Slide Image Placeholder 1"/>
+          <p:cNvSpPr>
+            <a:spLocks noGrp="1" noRot="1" noChangeAspect="1"/>
+          </p:cNvSpPr>
+          <p:nvPr>
+            <p:ph type="sldImg"/>
+          </p:nvPr>
+        </p:nvSpPr>
+        <p:spPr/>
+      </p:sp>
+      <p:sp>
+        <p:nvSpPr>
+          <p:cNvPr id="3" name="Notes Placeholder 2"/>
+          <p:cNvSpPr>
+            <a:spLocks noGrp="1"/>
+          </p:cNvSpPr>
+          <p:nvPr>
+            <p:ph type="body" idx="1"/>
+          </p:nvPr>
+        </p:nvSpPr>
+        <p:spPr/>
+        <p:txBody>
+          <a:bodyPr/>
+          <a:lstStyle/>
+          <a:p>
+            <a:endParaRPr lang="tr-TR" dirty="0"/>
+          </a:p>
+        </p:txBody>
+      </p:sp>
+      <p:sp>
+        <p:nvSpPr>
+          <p:cNvPr id="4" name="Slide Number Placeholder 3"/>
+          <p:cNvSpPr>
+            <a:spLocks noGrp="1"/>
+          </p:cNvSpPr>
+          <p:nvPr>
+            <p:ph type="sldNum" sz="quarter" idx="5"/>
+          </p:nvPr>
+        </p:nvSpPr>
+        <p:spPr/>
+        <p:txBody>
+          <a:bodyPr/>
+          <a:lstStyle/>
+          <a:p>
+            <a:fld id="{1F498F1E-81E0-4C09-8448-E6A2EE4AD087}" type="slidenum">
+              <a:rPr lang="tr-TR" smtClean="0"/>
+              <a:t>11</a:t>
+            </a:fld>
+            <a:endParaRPr lang="tr-TR"/>
+          </a:p>
+        </p:txBody>
+      </p:sp>
+    </p:spTree>
+    <p:extLst>
+      <p:ext uri="{BB962C8B-B14F-4D97-AF65-F5344CB8AC3E}">
+        <p14:creationId xmlns:p14="http://schemas.microsoft.com/office/powerpoint/2010/main" val="2991602507"/>
       </p:ext>
     </p:extLst>
   </p:cSld>
@@ -9273,6 +9358,263 @@
 </p:sld>
 </file>
 
+<file path=ppt/slides/slide11.xml><?xml version="1.0" encoding="utf-8"?>
+<p:sld xmlns:a="http://schemas.openxmlformats.org/drawingml/2006/main" xmlns:r="http://schemas.openxmlformats.org/officeDocument/2006/relationships" xmlns:p="http://schemas.openxmlformats.org/presentationml/2006/main">
+  <p:cSld>
+    <p:spTree>
+      <p:nvGrpSpPr>
+        <p:cNvPr id="1" name=""/>
+        <p:cNvGrpSpPr/>
+        <p:nvPr/>
+      </p:nvGrpSpPr>
+      <p:grpSpPr>
+        <a:xfrm>
+          <a:off x="0" y="0"/>
+          <a:ext cx="0" cy="0"/>
+          <a:chOff x="0" y="0"/>
+          <a:chExt cx="0" cy="0"/>
+        </a:xfrm>
+      </p:grpSpPr>
+      <p:sp>
+        <p:nvSpPr>
+          <p:cNvPr id="4" name="Title 1">
+            <a:extLst>
+              <a:ext uri="{FF2B5EF4-FFF2-40B4-BE49-F238E27FC236}">
+                <a16:creationId xmlns:a16="http://schemas.microsoft.com/office/drawing/2014/main" id="{C5EF72B0-B0CB-9CEC-42AC-5C3623C91666}"/>
+              </a:ext>
+            </a:extLst>
+          </p:cNvPr>
+          <p:cNvSpPr txBox="1">
+            <a:spLocks/>
+          </p:cNvSpPr>
+          <p:nvPr/>
+        </p:nvSpPr>
+        <p:spPr>
+          <a:xfrm>
+            <a:off x="466344" y="508275"/>
+            <a:ext cx="10529483" cy="1325563"/>
+          </a:xfrm>
+          <a:prstGeom prst="rect">
+            <a:avLst/>
+          </a:prstGeom>
+        </p:spPr>
+        <p:txBody>
+          <a:bodyPr vert="horz" lIns="91440" tIns="45720" rIns="91440" bIns="45720" rtlCol="0" anchor="ctr">
+            <a:normAutofit/>
+          </a:bodyPr>
+          <a:lstStyle>
+            <a:lvl1pPr algn="l" defTabSz="914400" rtl="0" eaLnBrk="1" latinLnBrk="0" hangingPunct="1">
+              <a:lnSpc>
+                <a:spcPct val="90000"/>
+              </a:lnSpc>
+              <a:spcBef>
+                <a:spcPct val="0"/>
+              </a:spcBef>
+              <a:buNone/>
+              <a:defRPr sz="4000" kern="1200">
+                <a:solidFill>
+                  <a:schemeClr val="tx1"/>
+                </a:solidFill>
+                <a:latin typeface="+mj-lt"/>
+                <a:ea typeface="+mj-ea"/>
+                <a:cs typeface="+mj-cs"/>
+              </a:defRPr>
+            </a:lvl1pPr>
+          </a:lstStyle>
+          <a:p>
+            <a:pPr>
+              <a:spcAft>
+                <a:spcPts val="600"/>
+              </a:spcAft>
+            </a:pPr>
+            <a:r>
+              <a:rPr lang="tr-TR" sz="4400" kern="1200" dirty="0">
+                <a:solidFill>
+                  <a:schemeClr val="tx1"/>
+                </a:solidFill>
+                <a:latin typeface="+mj-lt"/>
+                <a:ea typeface="+mj-ea"/>
+                <a:cs typeface="+mj-cs"/>
+              </a:rPr>
+              <a:t>İlave çalışmalar</a:t>
+            </a:r>
+            <a:endParaRPr lang="en-US" sz="4400" kern="1200" dirty="0">
+              <a:solidFill>
+                <a:schemeClr val="tx1"/>
+              </a:solidFill>
+              <a:latin typeface="+mj-lt"/>
+              <a:ea typeface="+mj-ea"/>
+              <a:cs typeface="+mj-cs"/>
+            </a:endParaRPr>
+          </a:p>
+        </p:txBody>
+      </p:sp>
+      <p:sp>
+        <p:nvSpPr>
+          <p:cNvPr id="20" name="TextBox 19">
+            <a:extLst>
+              <a:ext uri="{FF2B5EF4-FFF2-40B4-BE49-F238E27FC236}">
+                <a16:creationId xmlns:a16="http://schemas.microsoft.com/office/drawing/2014/main" id="{3614737E-121F-C83B-C93A-4D0FB09D438B}"/>
+              </a:ext>
+            </a:extLst>
+          </p:cNvPr>
+          <p:cNvSpPr txBox="1"/>
+          <p:nvPr/>
+        </p:nvSpPr>
+        <p:spPr>
+          <a:xfrm>
+            <a:off x="213824" y="1920435"/>
+            <a:ext cx="7384840" cy="4192520"/>
+          </a:xfrm>
+          <a:prstGeom prst="rect">
+            <a:avLst/>
+          </a:prstGeom>
+        </p:spPr>
+        <p:txBody>
+          <a:bodyPr vert="horz" lIns="91440" tIns="45720" rIns="91440" bIns="45720" rtlCol="0">
+            <a:normAutofit/>
+          </a:bodyPr>
+          <a:lstStyle/>
+          <a:p>
+            <a:pPr marL="542354" lvl="1" indent="-228600" defTabSz="914400">
+              <a:lnSpc>
+                <a:spcPct val="150000"/>
+              </a:lnSpc>
+              <a:spcAft>
+                <a:spcPts val="600"/>
+              </a:spcAft>
+              <a:buFont typeface="Arial" panose="020B0604020202020204" pitchFamily="34" charset="0"/>
+              <a:buChar char="•"/>
+            </a:pPr>
+            <a:r>
+              <a:rPr lang="tr-TR" sz="1600" b="1" dirty="0">
+                <a:solidFill>
+                  <a:srgbClr val="FF0000"/>
+                </a:solidFill>
+              </a:rPr>
+              <a:t>Nüfus, gelir ve cinsiyet bilgilerini içeren ilave bir veri seti ile </a:t>
+            </a:r>
+            <a:r>
+              <a:rPr lang="tr-TR" sz="1600" b="1" dirty="0" err="1">
+                <a:solidFill>
+                  <a:srgbClr val="FF0000"/>
+                </a:solidFill>
+              </a:rPr>
+              <a:t>join</a:t>
+            </a:r>
+            <a:endParaRPr lang="en-US" sz="1600" b="1" dirty="0">
+              <a:solidFill>
+                <a:srgbClr val="FF0000"/>
+              </a:solidFill>
+            </a:endParaRPr>
+          </a:p>
+        </p:txBody>
+      </p:sp>
+    </p:spTree>
+    <p:extLst>
+      <p:ext uri="{BB962C8B-B14F-4D97-AF65-F5344CB8AC3E}">
+        <p14:creationId xmlns:p14="http://schemas.microsoft.com/office/powerpoint/2010/main" val="1607208671"/>
+      </p:ext>
+    </p:extLst>
+  </p:cSld>
+  <p:clrMapOvr>
+    <a:masterClrMapping/>
+  </p:clrMapOvr>
+  <p:timing>
+    <p:tnLst>
+      <p:par>
+        <p:cTn id="1" dur="indefinite" restart="never" nodeType="tmRoot">
+          <p:childTnLst>
+            <p:seq concurrent="1" nextAc="seek">
+              <p:cTn id="2" dur="indefinite" nodeType="mainSeq">
+                <p:childTnLst>
+                  <p:par>
+                    <p:cTn id="3" fill="hold">
+                      <p:stCondLst>
+                        <p:cond delay="indefinite"/>
+                        <p:cond evt="onBegin" delay="0">
+                          <p:tn val="2"/>
+                        </p:cond>
+                      </p:stCondLst>
+                      <p:childTnLst>
+                        <p:par>
+                          <p:cTn id="4" fill="hold">
+                            <p:stCondLst>
+                              <p:cond delay="0"/>
+                            </p:stCondLst>
+                            <p:childTnLst>
+                              <p:par>
+                                <p:cTn id="5" presetID="10" presetClass="entr" presetSubtype="0" fill="hold" grpId="0" nodeType="withEffect">
+                                  <p:stCondLst>
+                                    <p:cond delay="1000"/>
+                                  </p:stCondLst>
+                                  <p:iterate>
+                                    <p:tmPct val="10000"/>
+                                  </p:iterate>
+                                  <p:childTnLst>
+                                    <p:set>
+                                      <p:cBhvr>
+                                        <p:cTn id="6" dur="1" fill="hold">
+                                          <p:stCondLst>
+                                            <p:cond delay="0"/>
+                                          </p:stCondLst>
+                                        </p:cTn>
+                                        <p:tgtEl>
+                                          <p:spTgt spid="4"/>
+                                        </p:tgtEl>
+                                        <p:attrNameLst>
+                                          <p:attrName>style.visibility</p:attrName>
+                                        </p:attrNameLst>
+                                      </p:cBhvr>
+                                      <p:to>
+                                        <p:strVal val="visible"/>
+                                      </p:to>
+                                    </p:set>
+                                    <p:animEffect transition="in" filter="fade">
+                                      <p:cBhvr>
+                                        <p:cTn id="7" dur="700"/>
+                                        <p:tgtEl>
+                                          <p:spTgt spid="4"/>
+                                        </p:tgtEl>
+                                      </p:cBhvr>
+                                    </p:animEffect>
+                                  </p:childTnLst>
+                                </p:cTn>
+                              </p:par>
+                            </p:childTnLst>
+                          </p:cTn>
+                        </p:par>
+                      </p:childTnLst>
+                    </p:cTn>
+                  </p:par>
+                </p:childTnLst>
+              </p:cTn>
+              <p:prevCondLst>
+                <p:cond evt="onPrev" delay="0">
+                  <p:tgtEl>
+                    <p:sldTgt/>
+                  </p:tgtEl>
+                </p:cond>
+              </p:prevCondLst>
+              <p:nextCondLst>
+                <p:cond evt="onNext" delay="0">
+                  <p:tgtEl>
+                    <p:sldTgt/>
+                  </p:tgtEl>
+                </p:cond>
+              </p:nextCondLst>
+            </p:seq>
+          </p:childTnLst>
+        </p:cTn>
+      </p:par>
+    </p:tnLst>
+    <p:bldLst>
+      <p:bldP spid="4" grpId="0"/>
+    </p:bldLst>
+  </p:timing>
+</p:sld>
+</file>
+
 <file path=ppt/slides/slide2.xml><?xml version="1.0" encoding="utf-8"?>
 <p:sld xmlns:a="http://schemas.openxmlformats.org/drawingml/2006/main" xmlns:r="http://schemas.openxmlformats.org/officeDocument/2006/relationships" xmlns:p="http://schemas.openxmlformats.org/presentationml/2006/main">
   <p:cSld>
@@ -11607,8 +11949,8 @@
         </p:nvSpPr>
         <p:spPr bwMode="auto">
           <a:xfrm>
-            <a:off x="1149096" y="1690688"/>
-            <a:ext cx="11149584" cy="3922832"/>
+            <a:off x="1231392" y="1772983"/>
+            <a:ext cx="11149584" cy="4405241"/>
           </a:xfrm>
           <a:prstGeom prst="rect">
             <a:avLst/>
@@ -11640,7 +11982,7 @@
             <a:prstTxWarp prst="textNoShape">
               <a:avLst/>
             </a:prstTxWarp>
-            <a:normAutofit/>
+            <a:normAutofit fontScale="92500"/>
           </a:bodyPr>
           <a:lstStyle/>
           <a:p>
@@ -12065,6 +12407,28 @@
             <a:r>
               <a:rPr lang="tr-TR" altLang="tr-TR" sz="1400" dirty="0"/>
               <a:t>.</a:t>
+            </a:r>
+          </a:p>
+          <a:p>
+            <a:pPr marR="0" lvl="0" indent="-228600" algn="just" defTabSz="914400" fontAlgn="base">
+              <a:lnSpc>
+                <a:spcPct val="300000"/>
+              </a:lnSpc>
+              <a:spcBef>
+                <a:spcPts val="1000"/>
+              </a:spcBef>
+              <a:spcAft>
+                <a:spcPct val="0"/>
+              </a:spcAft>
+              <a:buClrTx/>
+              <a:buSzTx/>
+              <a:buFont typeface="Arial" panose="020B0604020202020204" pitchFamily="34" charset="0"/>
+              <a:buChar char="•"/>
+              <a:tabLst/>
+            </a:pPr>
+            <a:r>
+              <a:rPr lang="tr-TR" altLang="tr-TR" sz="1400" dirty="0"/>
+              <a:t>Gün ve saat kolonları</a:t>
             </a:r>
           </a:p>
           <a:p>
@@ -13566,6 +13930,84 @@
           </a:prstGeom>
         </p:spPr>
       </p:pic>
+      <p:sp>
+        <p:nvSpPr>
+          <p:cNvPr id="2" name="TextBox 1">
+            <a:extLst>
+              <a:ext uri="{FF2B5EF4-FFF2-40B4-BE49-F238E27FC236}">
+                <a16:creationId xmlns:a16="http://schemas.microsoft.com/office/drawing/2014/main" id="{0F7DB3EF-F377-E65F-CFB3-63C9B38A5E88}"/>
+              </a:ext>
+            </a:extLst>
+          </p:cNvPr>
+          <p:cNvSpPr txBox="1"/>
+          <p:nvPr/>
+        </p:nvSpPr>
+        <p:spPr>
+          <a:xfrm>
+            <a:off x="7514693" y="5856369"/>
+            <a:ext cx="4049507" cy="369332"/>
+          </a:xfrm>
+          <a:prstGeom prst="rect">
+            <a:avLst/>
+          </a:prstGeom>
+          <a:noFill/>
+        </p:spPr>
+        <p:txBody>
+          <a:bodyPr wrap="none" rtlCol="0">
+            <a:spAutoFit/>
+          </a:bodyPr>
+          <a:lstStyle/>
+          <a:p>
+            <a:r>
+              <a:rPr lang="tr-TR" dirty="0">
+                <a:solidFill>
+                  <a:srgbClr val="FF0000"/>
+                </a:solidFill>
+              </a:rPr>
+              <a:t>ilk 3 istasyon toplamın % 50 si bilgisi</a:t>
+            </a:r>
+          </a:p>
+        </p:txBody>
+      </p:sp>
+      <p:sp>
+        <p:nvSpPr>
+          <p:cNvPr id="3" name="TextBox 2">
+            <a:extLst>
+              <a:ext uri="{FF2B5EF4-FFF2-40B4-BE49-F238E27FC236}">
+                <a16:creationId xmlns:a16="http://schemas.microsoft.com/office/drawing/2014/main" id="{84C31E65-217A-8195-15A9-BFC75F9F4D0E}"/>
+              </a:ext>
+            </a:extLst>
+          </p:cNvPr>
+          <p:cNvSpPr txBox="1"/>
+          <p:nvPr/>
+        </p:nvSpPr>
+        <p:spPr>
+          <a:xfrm>
+            <a:off x="618249" y="1955758"/>
+            <a:ext cx="3007555" cy="369332"/>
+          </a:xfrm>
+          <a:prstGeom prst="rect">
+            <a:avLst/>
+          </a:prstGeom>
+          <a:noFill/>
+        </p:spPr>
+        <p:txBody>
+          <a:bodyPr wrap="none" rtlCol="0">
+            <a:spAutoFit/>
+          </a:bodyPr>
+          <a:lstStyle/>
+          <a:p>
+            <a:r>
+              <a:rPr lang="tr-TR" dirty="0">
+                <a:solidFill>
+                  <a:srgbClr val="FF0000"/>
+                </a:solidFill>
+              </a:rPr>
+              <a:t>İstasyon adlarında kısaltma</a:t>
+            </a:r>
+          </a:p>
+        </p:txBody>
+      </p:sp>
     </p:spTree>
     <p:extLst>
       <p:ext uri="{BB962C8B-B14F-4D97-AF65-F5344CB8AC3E}">

</xml_diff>